<commit_message>
Added theory section on position on $n$ robots
</commit_message>
<xml_diff>
--- a/papers/ICRA2016/pictures/driftmove.pptx
+++ b/papers/ICRA2016/pictures/driftmove.pptx
@@ -7,7 +7,7 @@
   <p:sldIdLst>
     <p:sldId id="256" r:id="rId2"/>
   </p:sldIdLst>
-  <p:sldSz cx="9144000" cy="6858000" type="screen4x3"/>
+  <p:sldSz cx="9144000" cy="2743200"/>
   <p:notesSz cx="6858000" cy="9144000"/>
   <p:defaultTextStyle>
     <a:defPPr>
@@ -136,8 +136,8 @@
         </p:nvSpPr>
         <p:spPr>
           <a:xfrm>
-            <a:off x="685800" y="2130425"/>
-            <a:ext cx="7772400" cy="1470025"/>
+            <a:off x="685800" y="852170"/>
+            <a:ext cx="7772400" cy="588011"/>
           </a:xfrm>
         </p:spPr>
         <p:txBody>
@@ -164,8 +164,8 @@
         </p:nvSpPr>
         <p:spPr>
           <a:xfrm>
-            <a:off x="1371600" y="3886200"/>
-            <a:ext cx="6400800" cy="1752600"/>
+            <a:off x="1371600" y="1554480"/>
+            <a:ext cx="6400800" cy="701040"/>
           </a:xfrm>
         </p:spPr>
         <p:txBody>
@@ -548,8 +548,8 @@
         </p:nvSpPr>
         <p:spPr>
           <a:xfrm>
-            <a:off x="6629400" y="274638"/>
-            <a:ext cx="2057400" cy="5851525"/>
+            <a:off x="6629400" y="109856"/>
+            <a:ext cx="2057400" cy="2340611"/>
           </a:xfrm>
         </p:spPr>
         <p:txBody>
@@ -576,8 +576,8 @@
         </p:nvSpPr>
         <p:spPr>
           <a:xfrm>
-            <a:off x="457200" y="274638"/>
-            <a:ext cx="6019800" cy="5851525"/>
+            <a:off x="457200" y="109856"/>
+            <a:ext cx="6019800" cy="2340611"/>
           </a:xfrm>
         </p:spPr>
         <p:txBody>
@@ -898,8 +898,8 @@
         </p:nvSpPr>
         <p:spPr>
           <a:xfrm>
-            <a:off x="722313" y="4406900"/>
-            <a:ext cx="7772400" cy="1362075"/>
+            <a:off x="722313" y="1762759"/>
+            <a:ext cx="7772400" cy="544830"/>
           </a:xfrm>
         </p:spPr>
         <p:txBody>
@@ -930,8 +930,8 @@
         </p:nvSpPr>
         <p:spPr>
           <a:xfrm>
-            <a:off x="722313" y="2906713"/>
-            <a:ext cx="7772400" cy="1500187"/>
+            <a:off x="722313" y="1162686"/>
+            <a:ext cx="7772400" cy="600075"/>
           </a:xfrm>
         </p:spPr>
         <p:txBody>
@@ -1167,8 +1167,8 @@
         </p:nvSpPr>
         <p:spPr>
           <a:xfrm>
-            <a:off x="457200" y="1600200"/>
-            <a:ext cx="4038600" cy="4525963"/>
+            <a:off x="457200" y="640081"/>
+            <a:ext cx="4038600" cy="1810385"/>
           </a:xfrm>
         </p:spPr>
         <p:txBody>
@@ -1252,8 +1252,8 @@
         </p:nvSpPr>
         <p:spPr>
           <a:xfrm>
-            <a:off x="4648200" y="1600200"/>
-            <a:ext cx="4038600" cy="4525963"/>
+            <a:off x="4648200" y="640081"/>
+            <a:ext cx="4038600" cy="1810385"/>
           </a:xfrm>
         </p:spPr>
         <p:txBody>
@@ -1459,8 +1459,8 @@
         </p:nvSpPr>
         <p:spPr>
           <a:xfrm>
-            <a:off x="457200" y="1535113"/>
-            <a:ext cx="4040188" cy="639762"/>
+            <a:off x="457200" y="614047"/>
+            <a:ext cx="4040188" cy="255905"/>
           </a:xfrm>
         </p:spPr>
         <p:txBody>
@@ -1524,8 +1524,8 @@
         </p:nvSpPr>
         <p:spPr>
           <a:xfrm>
-            <a:off x="457200" y="2174875"/>
-            <a:ext cx="4040188" cy="3951288"/>
+            <a:off x="457200" y="869951"/>
+            <a:ext cx="4040188" cy="1580516"/>
           </a:xfrm>
         </p:spPr>
         <p:txBody>
@@ -1609,8 +1609,8 @@
         </p:nvSpPr>
         <p:spPr>
           <a:xfrm>
-            <a:off x="4645025" y="1535113"/>
-            <a:ext cx="4041775" cy="639762"/>
+            <a:off x="4645027" y="614047"/>
+            <a:ext cx="4041775" cy="255905"/>
           </a:xfrm>
         </p:spPr>
         <p:txBody>
@@ -1674,8 +1674,8 @@
         </p:nvSpPr>
         <p:spPr>
           <a:xfrm>
-            <a:off x="4645025" y="2174875"/>
-            <a:ext cx="4041775" cy="3951288"/>
+            <a:off x="4645027" y="869951"/>
+            <a:ext cx="4041775" cy="1580516"/>
           </a:xfrm>
         </p:spPr>
         <p:txBody>
@@ -2067,8 +2067,8 @@
         </p:nvSpPr>
         <p:spPr>
           <a:xfrm>
-            <a:off x="457200" y="273050"/>
-            <a:ext cx="3008313" cy="1162050"/>
+            <a:off x="457202" y="109220"/>
+            <a:ext cx="3008313" cy="464820"/>
           </a:xfrm>
         </p:spPr>
         <p:txBody>
@@ -2099,8 +2099,8 @@
         </p:nvSpPr>
         <p:spPr>
           <a:xfrm>
-            <a:off x="3575050" y="273050"/>
-            <a:ext cx="5111750" cy="5853113"/>
+            <a:off x="3575050" y="109221"/>
+            <a:ext cx="5111750" cy="2341245"/>
           </a:xfrm>
         </p:spPr>
         <p:txBody>
@@ -2184,8 +2184,8 @@
         </p:nvSpPr>
         <p:spPr>
           <a:xfrm>
-            <a:off x="457200" y="1435100"/>
-            <a:ext cx="3008313" cy="4691063"/>
+            <a:off x="457202" y="574041"/>
+            <a:ext cx="3008313" cy="1876425"/>
           </a:xfrm>
         </p:spPr>
         <p:txBody>
@@ -2344,8 +2344,8 @@
         </p:nvSpPr>
         <p:spPr>
           <a:xfrm>
-            <a:off x="1792288" y="4800600"/>
-            <a:ext cx="5486400" cy="566738"/>
+            <a:off x="1792288" y="1920240"/>
+            <a:ext cx="5486400" cy="226695"/>
           </a:xfrm>
         </p:spPr>
         <p:txBody>
@@ -2376,8 +2376,8 @@
         </p:nvSpPr>
         <p:spPr>
           <a:xfrm>
-            <a:off x="1792288" y="612775"/>
-            <a:ext cx="5486400" cy="4114800"/>
+            <a:off x="1792288" y="245111"/>
+            <a:ext cx="5486400" cy="1645920"/>
           </a:xfrm>
         </p:spPr>
         <p:txBody>
@@ -2437,8 +2437,8 @@
         </p:nvSpPr>
         <p:spPr>
           <a:xfrm>
-            <a:off x="1792288" y="5367338"/>
-            <a:ext cx="5486400" cy="804862"/>
+            <a:off x="1792288" y="2146935"/>
+            <a:ext cx="5486400" cy="321945"/>
           </a:xfrm>
         </p:spPr>
         <p:txBody>
@@ -2602,8 +2602,8 @@
         </p:nvSpPr>
         <p:spPr>
           <a:xfrm>
-            <a:off x="457200" y="274638"/>
-            <a:ext cx="8229600" cy="1143000"/>
+            <a:off x="457200" y="109856"/>
+            <a:ext cx="8229600" cy="457200"/>
           </a:xfrm>
           <a:prstGeom prst="rect">
             <a:avLst/>
@@ -2635,8 +2635,8 @@
         </p:nvSpPr>
         <p:spPr>
           <a:xfrm>
-            <a:off x="457200" y="1600200"/>
-            <a:ext cx="8229600" cy="4525963"/>
+            <a:off x="457200" y="640081"/>
+            <a:ext cx="8229600" cy="1810385"/>
           </a:xfrm>
           <a:prstGeom prst="rect">
             <a:avLst/>
@@ -2697,8 +2697,8 @@
         </p:nvSpPr>
         <p:spPr>
           <a:xfrm>
-            <a:off x="457200" y="6356350"/>
-            <a:ext cx="2133600" cy="365125"/>
+            <a:off x="457200" y="2542541"/>
+            <a:ext cx="2133600" cy="146051"/>
           </a:xfrm>
           <a:prstGeom prst="rect">
             <a:avLst/>
@@ -2738,8 +2738,8 @@
         </p:nvSpPr>
         <p:spPr>
           <a:xfrm>
-            <a:off x="3124200" y="6356350"/>
-            <a:ext cx="2895600" cy="365125"/>
+            <a:off x="3124200" y="2542541"/>
+            <a:ext cx="2895600" cy="146051"/>
           </a:xfrm>
           <a:prstGeom prst="rect">
             <a:avLst/>
@@ -2775,8 +2775,8 @@
         </p:nvSpPr>
         <p:spPr>
           <a:xfrm>
-            <a:off x="6553200" y="6356350"/>
-            <a:ext cx="2133600" cy="365125"/>
+            <a:off x="6553200" y="2542541"/>
+            <a:ext cx="2133600" cy="146051"/>
           </a:xfrm>
           <a:prstGeom prst="rect">
             <a:avLst/>
@@ -3095,102 +3095,27 @@
           <a:chExt cx="0" cy="0"/>
         </a:xfrm>
       </p:grpSpPr>
-      <p:sp>
-        <p:nvSpPr>
-          <p:cNvPr id="5" name="Oval 4"/>
-          <p:cNvSpPr>
-            <a:spLocks noChangeAspect="1"/>
-          </p:cNvSpPr>
-          <p:nvPr/>
-        </p:nvSpPr>
-        <p:spPr>
-          <a:xfrm>
-            <a:off x="1890758" y="2065284"/>
-            <a:ext cx="547910" cy="548640"/>
-          </a:xfrm>
-          <a:prstGeom prst="ellipse">
-            <a:avLst/>
-          </a:prstGeom>
-          <a:solidFill>
-            <a:schemeClr val="accent1"/>
-          </a:solidFill>
-        </p:spPr>
-        <p:style>
-          <a:lnRef idx="1">
-            <a:schemeClr val="accent1"/>
-          </a:lnRef>
-          <a:fillRef idx="3">
-            <a:schemeClr val="accent1"/>
-          </a:fillRef>
-          <a:effectRef idx="2">
-            <a:schemeClr val="accent1"/>
-          </a:effectRef>
-          <a:fontRef idx="minor">
-            <a:schemeClr val="lt1"/>
-          </a:fontRef>
-        </p:style>
-        <p:txBody>
-          <a:bodyPr rtlCol="0" anchor="ctr"/>
-          <a:lstStyle/>
-          <a:p>
-            <a:pPr algn="ctr"/>
-            <a:endParaRPr lang="en-US"/>
-          </a:p>
-        </p:txBody>
-      </p:sp>
-      <p:sp>
-        <p:nvSpPr>
-          <p:cNvPr id="6" name="Rectangle 5"/>
-          <p:cNvSpPr/>
-          <p:nvPr/>
-        </p:nvSpPr>
-        <p:spPr>
-          <a:xfrm>
-            <a:off x="2834342" y="0"/>
-            <a:ext cx="6332698" cy="317457"/>
-          </a:xfrm>
-          <a:prstGeom prst="rect">
-            <a:avLst/>
-          </a:prstGeom>
-        </p:spPr>
-        <p:style>
-          <a:lnRef idx="1">
-            <a:schemeClr val="accent1"/>
-          </a:lnRef>
-          <a:fillRef idx="3">
-            <a:schemeClr val="accent1"/>
-          </a:fillRef>
-          <a:effectRef idx="2">
-            <a:schemeClr val="accent1"/>
-          </a:effectRef>
-          <a:fontRef idx="minor">
-            <a:schemeClr val="lt1"/>
-          </a:fontRef>
-        </p:style>
-        <p:txBody>
-          <a:bodyPr rtlCol="0" anchor="ctr"/>
-          <a:lstStyle/>
-          <a:p>
-            <a:pPr algn="ctr"/>
-            <a:endParaRPr lang="en-US"/>
-          </a:p>
-        </p:txBody>
-      </p:sp>
       <p:cxnSp>
         <p:nvCxnSpPr>
-          <p:cNvPr id="9" name="Straight Arrow Connector 8"/>
+          <p:cNvPr id="85" name="Straight Arrow Connector 84"/>
           <p:cNvCxnSpPr/>
           <p:nvPr/>
         </p:nvCxnSpPr>
         <p:spPr>
           <a:xfrm>
-            <a:off x="4482124" y="1661979"/>
-            <a:ext cx="1391326" cy="1848719"/>
+            <a:off x="120690" y="1226582"/>
+            <a:ext cx="1391326" cy="818256"/>
           </a:xfrm>
           <a:prstGeom prst="straightConnector1">
             <a:avLst/>
           </a:prstGeom>
-          <a:ln w="76200" cmpd="sng">
+          <a:ln w="38100" cmpd="sng">
+            <a:solidFill>
+              <a:schemeClr val="tx1">
+                <a:lumMod val="75000"/>
+                <a:lumOff val="25000"/>
+              </a:schemeClr>
+            </a:solidFill>
             <a:headEnd type="none"/>
             <a:tailEnd type="triangle"/>
           </a:ln>
@@ -3212,19 +3137,25 @@
       </p:cxnSp>
       <p:cxnSp>
         <p:nvCxnSpPr>
-          <p:cNvPr id="11" name="Straight Arrow Connector 10"/>
+          <p:cNvPr id="86" name="Straight Arrow Connector 85"/>
           <p:cNvCxnSpPr/>
           <p:nvPr/>
         </p:nvCxnSpPr>
         <p:spPr>
           <a:xfrm flipV="1">
-            <a:off x="5873450" y="1661979"/>
-            <a:ext cx="1391326" cy="1848719"/>
+            <a:off x="1512016" y="1226582"/>
+            <a:ext cx="1391326" cy="818256"/>
           </a:xfrm>
           <a:prstGeom prst="straightConnector1">
             <a:avLst/>
           </a:prstGeom>
-          <a:ln w="76200" cmpd="sng">
+          <a:ln w="38100" cmpd="sng">
+            <a:solidFill>
+              <a:schemeClr val="tx1">
+                <a:lumMod val="75000"/>
+                <a:lumOff val="25000"/>
+              </a:schemeClr>
+            </a:solidFill>
             <a:headEnd type="none"/>
             <a:tailEnd type="triangle"/>
           </a:ln>
@@ -3246,19 +3177,25 @@
       </p:cxnSp>
       <p:cxnSp>
         <p:nvCxnSpPr>
-          <p:cNvPr id="13" name="Straight Arrow Connector 12"/>
+          <p:cNvPr id="87" name="Straight Arrow Connector 86"/>
           <p:cNvCxnSpPr/>
           <p:nvPr/>
         </p:nvCxnSpPr>
         <p:spPr>
           <a:xfrm flipH="1">
-            <a:off x="4482124" y="1661979"/>
-            <a:ext cx="2782652" cy="0"/>
+            <a:off x="1181742" y="1226582"/>
+            <a:ext cx="1721600" cy="0"/>
           </a:xfrm>
           <a:prstGeom prst="straightConnector1">
             <a:avLst/>
           </a:prstGeom>
-          <a:ln w="76200" cmpd="sng">
+          <a:ln w="38100" cmpd="sng">
+            <a:solidFill>
+              <a:schemeClr val="tx1">
+                <a:lumMod val="75000"/>
+                <a:lumOff val="25000"/>
+              </a:schemeClr>
+            </a:solidFill>
             <a:headEnd type="none"/>
             <a:tailEnd type="triangle"/>
           </a:ln>
@@ -3280,7 +3217,238 @@
       </p:cxnSp>
       <p:sp>
         <p:nvSpPr>
-          <p:cNvPr id="20" name="Oval 19"/>
+          <p:cNvPr id="88" name="Right Brace 87"/>
+          <p:cNvSpPr/>
+          <p:nvPr/>
+        </p:nvSpPr>
+        <p:spPr>
+          <a:xfrm rot="16200000">
+            <a:off x="1418634" y="-491844"/>
+            <a:ext cx="186764" cy="2782652"/>
+          </a:xfrm>
+          <a:prstGeom prst="rightBrace">
+            <a:avLst>
+              <a:gd name="adj1" fmla="val 72933"/>
+              <a:gd name="adj2" fmla="val 50000"/>
+            </a:avLst>
+          </a:prstGeom>
+        </p:spPr>
+        <p:style>
+          <a:lnRef idx="2">
+            <a:schemeClr val="accent1"/>
+          </a:lnRef>
+          <a:fillRef idx="0">
+            <a:schemeClr val="accent1"/>
+          </a:fillRef>
+          <a:effectRef idx="1">
+            <a:schemeClr val="accent1"/>
+          </a:effectRef>
+          <a:fontRef idx="minor">
+            <a:schemeClr val="tx1"/>
+          </a:fontRef>
+        </p:style>
+        <p:txBody>
+          <a:bodyPr rtlCol="0" anchor="ctr"/>
+          <a:lstStyle/>
+          <a:p>
+            <a:pPr algn="ctr"/>
+            <a:endParaRPr lang="en-US" sz="3200"/>
+          </a:p>
+        </p:txBody>
+      </p:sp>
+      <p:sp>
+        <p:nvSpPr>
+          <p:cNvPr id="89" name="Right Brace 88"/>
+          <p:cNvSpPr/>
+          <p:nvPr/>
+        </p:nvSpPr>
+        <p:spPr>
+          <a:xfrm rot="16200000">
+            <a:off x="1949160" y="210132"/>
+            <a:ext cx="186764" cy="1721600"/>
+          </a:xfrm>
+          <a:prstGeom prst="rightBrace">
+            <a:avLst>
+              <a:gd name="adj1" fmla="val 72933"/>
+              <a:gd name="adj2" fmla="val 50000"/>
+            </a:avLst>
+          </a:prstGeom>
+        </p:spPr>
+        <p:style>
+          <a:lnRef idx="2">
+            <a:schemeClr val="accent1"/>
+          </a:lnRef>
+          <a:fillRef idx="0">
+            <a:schemeClr val="accent1"/>
+          </a:fillRef>
+          <a:effectRef idx="1">
+            <a:schemeClr val="accent1"/>
+          </a:effectRef>
+          <a:fontRef idx="minor">
+            <a:schemeClr val="tx1"/>
+          </a:fontRef>
+        </p:style>
+        <p:txBody>
+          <a:bodyPr rtlCol="0" anchor="ctr"/>
+          <a:lstStyle/>
+          <a:p>
+            <a:pPr algn="ctr"/>
+            <a:endParaRPr lang="en-US" sz="3200"/>
+          </a:p>
+        </p:txBody>
+      </p:sp>
+      <p:sp>
+        <p:nvSpPr>
+          <p:cNvPr id="90" name="Right Brace 89"/>
+          <p:cNvSpPr/>
+          <p:nvPr/>
+        </p:nvSpPr>
+        <p:spPr>
+          <a:xfrm>
+            <a:off x="2958810" y="1226582"/>
+            <a:ext cx="186764" cy="818256"/>
+          </a:xfrm>
+          <a:prstGeom prst="rightBrace">
+            <a:avLst>
+              <a:gd name="adj1" fmla="val 72933"/>
+              <a:gd name="adj2" fmla="val 50000"/>
+            </a:avLst>
+          </a:prstGeom>
+        </p:spPr>
+        <p:style>
+          <a:lnRef idx="2">
+            <a:schemeClr val="accent1"/>
+          </a:lnRef>
+          <a:fillRef idx="0">
+            <a:schemeClr val="accent1"/>
+          </a:fillRef>
+          <a:effectRef idx="1">
+            <a:schemeClr val="accent1"/>
+          </a:effectRef>
+          <a:fontRef idx="minor">
+            <a:schemeClr val="tx1"/>
+          </a:fontRef>
+        </p:style>
+        <p:txBody>
+          <a:bodyPr rtlCol="0" anchor="ctr"/>
+          <a:lstStyle/>
+          <a:p>
+            <a:pPr algn="ctr"/>
+            <a:endParaRPr lang="en-US" sz="3200"/>
+          </a:p>
+        </p:txBody>
+      </p:sp>
+      <p:sp>
+        <p:nvSpPr>
+          <p:cNvPr id="91" name="TextBox 90"/>
+          <p:cNvSpPr txBox="1"/>
+          <p:nvPr/>
+        </p:nvSpPr>
+        <p:spPr>
+          <a:xfrm>
+            <a:off x="1308068" y="231352"/>
+            <a:ext cx="476624" cy="584776"/>
+          </a:xfrm>
+          <a:prstGeom prst="rect">
+            <a:avLst/>
+          </a:prstGeom>
+          <a:noFill/>
+        </p:spPr>
+        <p:txBody>
+          <a:bodyPr wrap="square" rtlCol="0">
+            <a:spAutoFit/>
+          </a:bodyPr>
+          <a:lstStyle/>
+          <a:p>
+            <a:r>
+              <a:rPr lang="en-US" sz="3200" dirty="0" smtClean="0">
+                <a:latin typeface="Times New Roman"/>
+                <a:cs typeface="Times New Roman"/>
+              </a:rPr>
+              <a:t>β</a:t>
+            </a:r>
+            <a:endParaRPr lang="en-US" sz="3200" dirty="0">
+              <a:latin typeface="Times New Roman"/>
+              <a:cs typeface="Times New Roman"/>
+            </a:endParaRPr>
+          </a:p>
+        </p:txBody>
+      </p:sp>
+      <p:sp>
+        <p:nvSpPr>
+          <p:cNvPr id="92" name="TextBox 91"/>
+          <p:cNvSpPr txBox="1"/>
+          <p:nvPr/>
+        </p:nvSpPr>
+        <p:spPr>
+          <a:xfrm>
+            <a:off x="3129699" y="1266199"/>
+            <a:ext cx="1181100" cy="584776"/>
+          </a:xfrm>
+          <a:prstGeom prst="rect">
+            <a:avLst/>
+          </a:prstGeom>
+          <a:noFill/>
+        </p:spPr>
+        <p:txBody>
+          <a:bodyPr wrap="square" rtlCol="0">
+            <a:spAutoFit/>
+          </a:bodyPr>
+          <a:lstStyle/>
+          <a:p>
+            <a:r>
+              <a:rPr lang="en-US" sz="3200" dirty="0" err="1" smtClean="0">
+                <a:latin typeface="Times New Roman"/>
+                <a:cs typeface="Times New Roman"/>
+              </a:rPr>
+              <a:t>ε</a:t>
+            </a:r>
+            <a:endParaRPr lang="en-US" sz="3200" dirty="0">
+              <a:latin typeface="Times New Roman"/>
+              <a:cs typeface="Times New Roman"/>
+            </a:endParaRPr>
+          </a:p>
+        </p:txBody>
+      </p:sp>
+      <p:sp>
+        <p:nvSpPr>
+          <p:cNvPr id="93" name="TextBox 92"/>
+          <p:cNvSpPr txBox="1"/>
+          <p:nvPr/>
+        </p:nvSpPr>
+        <p:spPr>
+          <a:xfrm>
+            <a:off x="1848492" y="366917"/>
+            <a:ext cx="1181100" cy="584776"/>
+          </a:xfrm>
+          <a:prstGeom prst="rect">
+            <a:avLst/>
+          </a:prstGeom>
+          <a:noFill/>
+        </p:spPr>
+        <p:txBody>
+          <a:bodyPr wrap="square" rtlCol="0">
+            <a:spAutoFit/>
+          </a:bodyPr>
+          <a:lstStyle/>
+          <a:p>
+            <a:r>
+              <a:rPr lang="en-US" sz="3200" dirty="0" smtClean="0">
+                <a:latin typeface="Times New Roman"/>
+                <a:cs typeface="Times New Roman"/>
+              </a:rPr>
+              <a:t>α</a:t>
+            </a:r>
+            <a:endParaRPr lang="en-US" sz="3200" dirty="0">
+              <a:latin typeface="Times New Roman"/>
+              <a:cs typeface="Times New Roman"/>
+            </a:endParaRPr>
+          </a:p>
+        </p:txBody>
+      </p:sp>
+      <p:sp>
+        <p:nvSpPr>
+          <p:cNvPr id="94" name="Oval 93"/>
           <p:cNvSpPr>
             <a:spLocks noChangeAspect="1"/>
           </p:cNvSpPr>
@@ -3288,21 +3456,19 @@
         </p:nvSpPr>
         <p:spPr>
           <a:xfrm>
-            <a:off x="3157369" y="317457"/>
+            <a:off x="7769752" y="1186765"/>
             <a:ext cx="547910" cy="548640"/>
           </a:xfrm>
           <a:prstGeom prst="ellipse">
             <a:avLst/>
           </a:prstGeom>
           <a:solidFill>
-            <a:schemeClr val="accent2">
-              <a:lumMod val="75000"/>
+            <a:schemeClr val="accent1">
+              <a:alpha val="78000"/>
             </a:schemeClr>
           </a:solidFill>
           <a:ln>
-            <a:solidFill>
-              <a:schemeClr val="accent2"/>
-            </a:solidFill>
+            <a:noFill/>
           </a:ln>
         </p:spPr>
         <p:style>
@@ -3324,10 +3490,1187 @@
           <a:lstStyle/>
           <a:p>
             <a:pPr algn="ctr"/>
-            <a:endParaRPr lang="en-US">
+            <a:endParaRPr lang="en-US" sz="3200"/>
+          </a:p>
+        </p:txBody>
+      </p:sp>
+      <p:sp>
+        <p:nvSpPr>
+          <p:cNvPr id="95" name="Oval 94"/>
+          <p:cNvSpPr>
+            <a:spLocks noChangeAspect="1"/>
+          </p:cNvSpPr>
+          <p:nvPr/>
+        </p:nvSpPr>
+        <p:spPr>
+          <a:xfrm>
+            <a:off x="7286207" y="1186765"/>
+            <a:ext cx="547910" cy="548640"/>
+          </a:xfrm>
+          <a:prstGeom prst="ellipse">
+            <a:avLst/>
+          </a:prstGeom>
+          <a:solidFill>
+            <a:schemeClr val="accent1">
+              <a:alpha val="90000"/>
+            </a:schemeClr>
+          </a:solidFill>
+          <a:ln>
+            <a:noFill/>
+          </a:ln>
+        </p:spPr>
+        <p:style>
+          <a:lnRef idx="1">
+            <a:schemeClr val="accent1"/>
+          </a:lnRef>
+          <a:fillRef idx="3">
+            <a:schemeClr val="accent1"/>
+          </a:fillRef>
+          <a:effectRef idx="2">
+            <a:schemeClr val="accent1"/>
+          </a:effectRef>
+          <a:fontRef idx="minor">
+            <a:schemeClr val="lt1"/>
+          </a:fontRef>
+        </p:style>
+        <p:txBody>
+          <a:bodyPr rtlCol="0" anchor="ctr"/>
+          <a:lstStyle/>
+          <a:p>
+            <a:pPr algn="ctr"/>
+            <a:endParaRPr lang="en-US" sz="3200"/>
+          </a:p>
+        </p:txBody>
+      </p:sp>
+      <p:sp>
+        <p:nvSpPr>
+          <p:cNvPr id="96" name="Oval 95"/>
+          <p:cNvSpPr>
+            <a:spLocks noChangeAspect="1"/>
+          </p:cNvSpPr>
+          <p:nvPr/>
+        </p:nvSpPr>
+        <p:spPr>
+          <a:xfrm>
+            <a:off x="5714135" y="1186765"/>
+            <a:ext cx="547910" cy="548640"/>
+          </a:xfrm>
+          <a:prstGeom prst="ellipse">
+            <a:avLst/>
+          </a:prstGeom>
+          <a:solidFill>
+            <a:schemeClr val="accent1">
+              <a:alpha val="16000"/>
+            </a:schemeClr>
+          </a:solidFill>
+          <a:ln>
+            <a:noFill/>
+          </a:ln>
+        </p:spPr>
+        <p:style>
+          <a:lnRef idx="1">
+            <a:schemeClr val="accent1"/>
+          </a:lnRef>
+          <a:fillRef idx="3">
+            <a:schemeClr val="accent1"/>
+          </a:fillRef>
+          <a:effectRef idx="2">
+            <a:schemeClr val="accent1"/>
+          </a:effectRef>
+          <a:fontRef idx="minor">
+            <a:schemeClr val="lt1"/>
+          </a:fontRef>
+        </p:style>
+        <p:txBody>
+          <a:bodyPr rtlCol="0" anchor="ctr"/>
+          <a:lstStyle/>
+          <a:p>
+            <a:pPr algn="ctr"/>
+            <a:endParaRPr lang="en-US" sz="3200"/>
+          </a:p>
+        </p:txBody>
+      </p:sp>
+      <p:sp>
+        <p:nvSpPr>
+          <p:cNvPr id="97" name="Oval 96"/>
+          <p:cNvSpPr>
+            <a:spLocks noChangeAspect="1"/>
+          </p:cNvSpPr>
+          <p:nvPr/>
+        </p:nvSpPr>
+        <p:spPr>
+          <a:xfrm>
+            <a:off x="7105461" y="2005021"/>
+            <a:ext cx="547910" cy="548640"/>
+          </a:xfrm>
+          <a:prstGeom prst="ellipse">
+            <a:avLst/>
+          </a:prstGeom>
+          <a:solidFill>
+            <a:schemeClr val="accent1">
+              <a:alpha val="42000"/>
+            </a:schemeClr>
+          </a:solidFill>
+          <a:ln>
+            <a:noFill/>
+          </a:ln>
+        </p:spPr>
+        <p:style>
+          <a:lnRef idx="1">
+            <a:schemeClr val="accent1"/>
+          </a:lnRef>
+          <a:fillRef idx="3">
+            <a:schemeClr val="accent1"/>
+          </a:fillRef>
+          <a:effectRef idx="2">
+            <a:schemeClr val="accent1"/>
+          </a:effectRef>
+          <a:fontRef idx="minor">
+            <a:schemeClr val="lt1"/>
+          </a:fontRef>
+        </p:style>
+        <p:txBody>
+          <a:bodyPr rtlCol="0" anchor="ctr"/>
+          <a:lstStyle/>
+          <a:p>
+            <a:pPr algn="ctr"/>
+            <a:endParaRPr lang="en-US" sz="3200"/>
+          </a:p>
+        </p:txBody>
+      </p:sp>
+      <p:sp>
+        <p:nvSpPr>
+          <p:cNvPr id="98" name="Oval 97"/>
+          <p:cNvSpPr>
+            <a:spLocks noChangeAspect="1"/>
+          </p:cNvSpPr>
+          <p:nvPr/>
+        </p:nvSpPr>
+        <p:spPr>
+          <a:xfrm>
+            <a:off x="8496787" y="1186765"/>
+            <a:ext cx="547910" cy="548640"/>
+          </a:xfrm>
+          <a:prstGeom prst="ellipse">
+            <a:avLst/>
+          </a:prstGeom>
+          <a:solidFill>
+            <a:schemeClr val="accent1">
+              <a:alpha val="63000"/>
+            </a:schemeClr>
+          </a:solidFill>
+          <a:ln>
+            <a:noFill/>
+          </a:ln>
+        </p:spPr>
+        <p:style>
+          <a:lnRef idx="1">
+            <a:schemeClr val="accent1"/>
+          </a:lnRef>
+          <a:fillRef idx="3">
+            <a:schemeClr val="accent1"/>
+          </a:fillRef>
+          <a:effectRef idx="2">
+            <a:schemeClr val="accent1"/>
+          </a:effectRef>
+          <a:fontRef idx="minor">
+            <a:schemeClr val="lt1"/>
+          </a:fontRef>
+        </p:style>
+        <p:txBody>
+          <a:bodyPr rtlCol="0" anchor="ctr"/>
+          <a:lstStyle/>
+          <a:p>
+            <a:pPr algn="ctr"/>
+            <a:endParaRPr lang="en-US" sz="3200"/>
+          </a:p>
+        </p:txBody>
+      </p:sp>
+      <p:sp>
+        <p:nvSpPr>
+          <p:cNvPr id="99" name="Oval 98"/>
+          <p:cNvSpPr>
+            <a:spLocks noChangeAspect="1"/>
+          </p:cNvSpPr>
+          <p:nvPr/>
+        </p:nvSpPr>
+        <p:spPr>
+          <a:xfrm>
+            <a:off x="6831506" y="1186765"/>
+            <a:ext cx="547910" cy="548640"/>
+          </a:xfrm>
+          <a:prstGeom prst="ellipse">
+            <a:avLst/>
+          </a:prstGeom>
+          <a:solidFill>
+            <a:schemeClr val="accent1"/>
+          </a:solidFill>
+          <a:ln>
+            <a:noFill/>
+          </a:ln>
+        </p:spPr>
+        <p:style>
+          <a:lnRef idx="1">
+            <a:schemeClr val="accent1"/>
+          </a:lnRef>
+          <a:fillRef idx="3">
+            <a:schemeClr val="accent1"/>
+          </a:fillRef>
+          <a:effectRef idx="2">
+            <a:schemeClr val="accent1"/>
+          </a:effectRef>
+          <a:fontRef idx="minor">
+            <a:schemeClr val="lt1"/>
+          </a:fontRef>
+        </p:style>
+        <p:txBody>
+          <a:bodyPr rtlCol="0" anchor="ctr"/>
+          <a:lstStyle/>
+          <a:p>
+            <a:pPr algn="ctr"/>
+            <a:endParaRPr lang="en-US" sz="3200"/>
+          </a:p>
+        </p:txBody>
+      </p:sp>
+      <p:sp>
+        <p:nvSpPr>
+          <p:cNvPr id="100" name="Oval 99"/>
+          <p:cNvSpPr>
+            <a:spLocks noChangeAspect="1"/>
+          </p:cNvSpPr>
+          <p:nvPr/>
+        </p:nvSpPr>
+        <p:spPr>
+          <a:xfrm>
+            <a:off x="6194912" y="317457"/>
+            <a:ext cx="547910" cy="548640"/>
+          </a:xfrm>
+          <a:prstGeom prst="ellipse">
+            <a:avLst/>
+          </a:prstGeom>
+          <a:solidFill>
+            <a:schemeClr val="accent3">
+              <a:lumMod val="50000"/>
+            </a:schemeClr>
+          </a:solidFill>
+          <a:ln>
+            <a:noFill/>
+          </a:ln>
+        </p:spPr>
+        <p:style>
+          <a:lnRef idx="1">
+            <a:schemeClr val="accent1"/>
+          </a:lnRef>
+          <a:fillRef idx="3">
+            <a:schemeClr val="accent1"/>
+          </a:fillRef>
+          <a:effectRef idx="2">
+            <a:schemeClr val="accent1"/>
+          </a:effectRef>
+          <a:fontRef idx="minor">
+            <a:schemeClr val="lt1"/>
+          </a:fontRef>
+        </p:style>
+        <p:txBody>
+          <a:bodyPr rtlCol="0" anchor="ctr"/>
+          <a:lstStyle/>
+          <a:p>
+            <a:pPr algn="ctr"/>
+            <a:endParaRPr lang="en-US" sz="3200"/>
+          </a:p>
+        </p:txBody>
+      </p:sp>
+      <p:sp>
+        <p:nvSpPr>
+          <p:cNvPr id="101" name="Oval 100"/>
+          <p:cNvSpPr>
+            <a:spLocks noChangeAspect="1"/>
+          </p:cNvSpPr>
+          <p:nvPr/>
+        </p:nvSpPr>
+        <p:spPr>
+          <a:xfrm>
+            <a:off x="3415475" y="317457"/>
+            <a:ext cx="547910" cy="548640"/>
+          </a:xfrm>
+          <a:prstGeom prst="ellipse">
+            <a:avLst/>
+          </a:prstGeom>
+          <a:solidFill>
+            <a:srgbClr val="4F6228">
+              <a:alpha val="16000"/>
+            </a:srgbClr>
+          </a:solidFill>
+          <a:ln>
+            <a:noFill/>
+          </a:ln>
+        </p:spPr>
+        <p:style>
+          <a:lnRef idx="1">
+            <a:schemeClr val="accent1"/>
+          </a:lnRef>
+          <a:fillRef idx="3">
+            <a:schemeClr val="accent1"/>
+          </a:fillRef>
+          <a:effectRef idx="2">
+            <a:schemeClr val="accent1"/>
+          </a:effectRef>
+          <a:fontRef idx="minor">
+            <a:schemeClr val="lt1"/>
+          </a:fontRef>
+        </p:style>
+        <p:txBody>
+          <a:bodyPr rtlCol="0" anchor="ctr"/>
+          <a:lstStyle/>
+          <a:p>
+            <a:pPr algn="ctr"/>
+            <a:endParaRPr lang="en-US" sz="3200"/>
+          </a:p>
+        </p:txBody>
+      </p:sp>
+      <p:sp>
+        <p:nvSpPr>
+          <p:cNvPr id="102" name="Oval 101"/>
+          <p:cNvSpPr>
+            <a:spLocks noChangeAspect="1"/>
+          </p:cNvSpPr>
+          <p:nvPr/>
+        </p:nvSpPr>
+        <p:spPr>
+          <a:xfrm>
+            <a:off x="4803586" y="1127672"/>
+            <a:ext cx="547910" cy="548640"/>
+          </a:xfrm>
+          <a:prstGeom prst="ellipse">
+            <a:avLst/>
+          </a:prstGeom>
+          <a:solidFill>
+            <a:srgbClr val="4F6228">
+              <a:alpha val="42000"/>
+            </a:srgbClr>
+          </a:solidFill>
+          <a:ln>
+            <a:noFill/>
+          </a:ln>
+        </p:spPr>
+        <p:style>
+          <a:lnRef idx="1">
+            <a:schemeClr val="accent1"/>
+          </a:lnRef>
+          <a:fillRef idx="3">
+            <a:schemeClr val="accent1"/>
+          </a:fillRef>
+          <a:effectRef idx="2">
+            <a:schemeClr val="accent1"/>
+          </a:effectRef>
+          <a:fontRef idx="minor">
+            <a:schemeClr val="lt1"/>
+          </a:fontRef>
+        </p:style>
+        <p:txBody>
+          <a:bodyPr rtlCol="0" anchor="ctr"/>
+          <a:lstStyle/>
+          <a:p>
+            <a:pPr algn="ctr"/>
+            <a:endParaRPr lang="en-US" sz="3200"/>
+          </a:p>
+        </p:txBody>
+      </p:sp>
+      <p:sp>
+        <p:nvSpPr>
+          <p:cNvPr id="103" name="TextBox 102"/>
+          <p:cNvSpPr txBox="1"/>
+          <p:nvPr/>
+        </p:nvSpPr>
+        <p:spPr>
+          <a:xfrm>
+            <a:off x="3463100" y="252035"/>
+            <a:ext cx="1181100" cy="584776"/>
+          </a:xfrm>
+          <a:prstGeom prst="rect">
+            <a:avLst/>
+          </a:prstGeom>
+          <a:noFill/>
+        </p:spPr>
+        <p:txBody>
+          <a:bodyPr wrap="square" rtlCol="0">
+            <a:spAutoFit/>
+          </a:bodyPr>
+          <a:lstStyle/>
+          <a:p>
+            <a:r>
+              <a:rPr lang="en-US" sz="3200" dirty="0" smtClean="0">
+                <a:solidFill>
+                  <a:schemeClr val="bg1"/>
+                </a:solidFill>
+                <a:latin typeface="Times New Roman"/>
+                <a:cs typeface="Times New Roman"/>
+              </a:rPr>
+              <a:t>A</a:t>
+            </a:r>
+            <a:endParaRPr lang="en-US" sz="3200" dirty="0">
               <a:solidFill>
-                <a:srgbClr val="FF0000"/>
+                <a:schemeClr val="bg1"/>
               </a:solidFill>
+              <a:latin typeface="Times New Roman"/>
+              <a:cs typeface="Times New Roman"/>
+            </a:endParaRPr>
+          </a:p>
+        </p:txBody>
+      </p:sp>
+      <p:sp>
+        <p:nvSpPr>
+          <p:cNvPr id="104" name="TextBox 103"/>
+          <p:cNvSpPr txBox="1"/>
+          <p:nvPr/>
+        </p:nvSpPr>
+        <p:spPr>
+          <a:xfrm>
+            <a:off x="4810767" y="1091536"/>
+            <a:ext cx="1181100" cy="584776"/>
+          </a:xfrm>
+          <a:prstGeom prst="rect">
+            <a:avLst/>
+          </a:prstGeom>
+          <a:noFill/>
+        </p:spPr>
+        <p:txBody>
+          <a:bodyPr wrap="square" rtlCol="0">
+            <a:spAutoFit/>
+          </a:bodyPr>
+          <a:lstStyle/>
+          <a:p>
+            <a:r>
+              <a:rPr lang="en-US" sz="3200" dirty="0" smtClean="0">
+                <a:solidFill>
+                  <a:schemeClr val="bg1"/>
+                </a:solidFill>
+                <a:latin typeface="Times New Roman"/>
+                <a:cs typeface="Times New Roman"/>
+              </a:rPr>
+              <a:t>A</a:t>
+            </a:r>
+            <a:endParaRPr lang="en-US" sz="3200" dirty="0">
+              <a:solidFill>
+                <a:schemeClr val="bg1"/>
+              </a:solidFill>
+              <a:latin typeface="Times New Roman"/>
+              <a:cs typeface="Times New Roman"/>
+            </a:endParaRPr>
+          </a:p>
+        </p:txBody>
+      </p:sp>
+      <p:sp>
+        <p:nvSpPr>
+          <p:cNvPr id="105" name="TextBox 104"/>
+          <p:cNvSpPr txBox="1"/>
+          <p:nvPr/>
+        </p:nvSpPr>
+        <p:spPr>
+          <a:xfrm>
+            <a:off x="6230295" y="251828"/>
+            <a:ext cx="1181100" cy="584776"/>
+          </a:xfrm>
+          <a:prstGeom prst="rect">
+            <a:avLst/>
+          </a:prstGeom>
+          <a:noFill/>
+        </p:spPr>
+        <p:txBody>
+          <a:bodyPr wrap="square" rtlCol="0">
+            <a:spAutoFit/>
+          </a:bodyPr>
+          <a:lstStyle/>
+          <a:p>
+            <a:r>
+              <a:rPr lang="en-US" sz="3200" dirty="0" smtClean="0">
+                <a:solidFill>
+                  <a:schemeClr val="bg1"/>
+                </a:solidFill>
+                <a:latin typeface="Times New Roman"/>
+                <a:cs typeface="Times New Roman"/>
+              </a:rPr>
+              <a:t>A</a:t>
+            </a:r>
+            <a:endParaRPr lang="en-US" sz="3200" dirty="0">
+              <a:solidFill>
+                <a:schemeClr val="bg1"/>
+              </a:solidFill>
+              <a:latin typeface="Times New Roman"/>
+              <a:cs typeface="Times New Roman"/>
+            </a:endParaRPr>
+          </a:p>
+        </p:txBody>
+      </p:sp>
+      <p:grpSp>
+        <p:nvGrpSpPr>
+          <p:cNvPr id="106" name="Group 105"/>
+          <p:cNvGrpSpPr/>
+          <p:nvPr/>
+        </p:nvGrpSpPr>
+        <p:grpSpPr>
+          <a:xfrm>
+            <a:off x="3686215" y="623591"/>
+            <a:ext cx="2782652" cy="818256"/>
+            <a:chOff x="4860965" y="583736"/>
+            <a:chExt cx="2782652" cy="818256"/>
+          </a:xfrm>
+        </p:grpSpPr>
+        <p:cxnSp>
+          <p:nvCxnSpPr>
+            <p:cNvPr id="107" name="Straight Arrow Connector 106"/>
+            <p:cNvCxnSpPr/>
+            <p:nvPr/>
+          </p:nvCxnSpPr>
+          <p:spPr>
+            <a:xfrm>
+              <a:off x="4860965" y="583736"/>
+              <a:ext cx="1391326" cy="818256"/>
+            </a:xfrm>
+            <a:prstGeom prst="straightConnector1">
+              <a:avLst/>
+            </a:prstGeom>
+            <a:ln w="38100" cmpd="sng">
+              <a:solidFill>
+                <a:schemeClr val="tx1">
+                  <a:lumMod val="75000"/>
+                  <a:lumOff val="25000"/>
+                </a:schemeClr>
+              </a:solidFill>
+              <a:headEnd type="none"/>
+              <a:tailEnd type="triangle"/>
+            </a:ln>
+          </p:spPr>
+          <p:style>
+            <a:lnRef idx="2">
+              <a:schemeClr val="accent1"/>
+            </a:lnRef>
+            <a:fillRef idx="0">
+              <a:schemeClr val="accent1"/>
+            </a:fillRef>
+            <a:effectRef idx="1">
+              <a:schemeClr val="accent1"/>
+            </a:effectRef>
+            <a:fontRef idx="minor">
+              <a:schemeClr val="tx1"/>
+            </a:fontRef>
+          </p:style>
+        </p:cxnSp>
+        <p:cxnSp>
+          <p:nvCxnSpPr>
+            <p:cNvPr id="108" name="Straight Arrow Connector 107"/>
+            <p:cNvCxnSpPr/>
+            <p:nvPr/>
+          </p:nvCxnSpPr>
+          <p:spPr>
+            <a:xfrm flipV="1">
+              <a:off x="6252291" y="583736"/>
+              <a:ext cx="1391326" cy="818256"/>
+            </a:xfrm>
+            <a:prstGeom prst="straightConnector1">
+              <a:avLst/>
+            </a:prstGeom>
+            <a:ln w="38100" cmpd="sng">
+              <a:solidFill>
+                <a:schemeClr val="tx1">
+                  <a:lumMod val="75000"/>
+                  <a:lumOff val="25000"/>
+                </a:schemeClr>
+              </a:solidFill>
+              <a:headEnd type="none"/>
+              <a:tailEnd type="triangle"/>
+            </a:ln>
+          </p:spPr>
+          <p:style>
+            <a:lnRef idx="2">
+              <a:schemeClr val="accent1"/>
+            </a:lnRef>
+            <a:fillRef idx="0">
+              <a:schemeClr val="accent1"/>
+            </a:fillRef>
+            <a:effectRef idx="1">
+              <a:schemeClr val="accent1"/>
+            </a:effectRef>
+            <a:fontRef idx="minor">
+              <a:schemeClr val="tx1"/>
+            </a:fontRef>
+          </p:style>
+        </p:cxnSp>
+        <p:cxnSp>
+          <p:nvCxnSpPr>
+            <p:cNvPr id="109" name="Straight Arrow Connector 108"/>
+            <p:cNvCxnSpPr/>
+            <p:nvPr/>
+          </p:nvCxnSpPr>
+          <p:spPr>
+            <a:xfrm flipH="1">
+              <a:off x="5922017" y="583736"/>
+              <a:ext cx="1721600" cy="0"/>
+            </a:xfrm>
+            <a:prstGeom prst="straightConnector1">
+              <a:avLst/>
+            </a:prstGeom>
+            <a:ln w="38100" cmpd="sng">
+              <a:solidFill>
+                <a:schemeClr val="tx1">
+                  <a:lumMod val="75000"/>
+                  <a:lumOff val="25000"/>
+                </a:schemeClr>
+              </a:solidFill>
+              <a:headEnd type="none"/>
+              <a:tailEnd type="triangle"/>
+            </a:ln>
+          </p:spPr>
+          <p:style>
+            <a:lnRef idx="2">
+              <a:schemeClr val="accent1"/>
+            </a:lnRef>
+            <a:fillRef idx="0">
+              <a:schemeClr val="accent1"/>
+            </a:fillRef>
+            <a:effectRef idx="1">
+              <a:schemeClr val="accent1"/>
+            </a:effectRef>
+            <a:fontRef idx="minor">
+              <a:schemeClr val="tx1"/>
+            </a:fontRef>
+          </p:style>
+        </p:cxnSp>
+      </p:grpSp>
+      <p:sp>
+        <p:nvSpPr>
+          <p:cNvPr id="110" name="TextBox 109"/>
+          <p:cNvSpPr txBox="1"/>
+          <p:nvPr/>
+        </p:nvSpPr>
+        <p:spPr>
+          <a:xfrm>
+            <a:off x="5761760" y="1127672"/>
+            <a:ext cx="1181100" cy="584776"/>
+          </a:xfrm>
+          <a:prstGeom prst="rect">
+            <a:avLst/>
+          </a:prstGeom>
+          <a:noFill/>
+        </p:spPr>
+        <p:txBody>
+          <a:bodyPr wrap="square" rtlCol="0">
+            <a:spAutoFit/>
+          </a:bodyPr>
+          <a:lstStyle/>
+          <a:p>
+            <a:r>
+              <a:rPr lang="en-US" sz="3200" dirty="0" smtClean="0">
+                <a:solidFill>
+                  <a:schemeClr val="bg1"/>
+                </a:solidFill>
+                <a:latin typeface="Times New Roman"/>
+                <a:cs typeface="Times New Roman"/>
+              </a:rPr>
+              <a:t>B</a:t>
+            </a:r>
+            <a:endParaRPr lang="en-US" sz="3200" dirty="0">
+              <a:solidFill>
+                <a:schemeClr val="bg1"/>
+              </a:solidFill>
+              <a:latin typeface="Times New Roman"/>
+              <a:cs typeface="Times New Roman"/>
+            </a:endParaRPr>
+          </a:p>
+        </p:txBody>
+      </p:sp>
+      <p:sp>
+        <p:nvSpPr>
+          <p:cNvPr id="111" name="TextBox 110"/>
+          <p:cNvSpPr txBox="1"/>
+          <p:nvPr/>
+        </p:nvSpPr>
+        <p:spPr>
+          <a:xfrm>
+            <a:off x="7148804" y="1968885"/>
+            <a:ext cx="1181100" cy="584776"/>
+          </a:xfrm>
+          <a:prstGeom prst="rect">
+            <a:avLst/>
+          </a:prstGeom>
+          <a:noFill/>
+        </p:spPr>
+        <p:txBody>
+          <a:bodyPr wrap="square" rtlCol="0">
+            <a:spAutoFit/>
+          </a:bodyPr>
+          <a:lstStyle/>
+          <a:p>
+            <a:r>
+              <a:rPr lang="en-US" sz="3200" dirty="0" smtClean="0">
+                <a:solidFill>
+                  <a:schemeClr val="bg1"/>
+                </a:solidFill>
+                <a:latin typeface="Times New Roman"/>
+                <a:cs typeface="Times New Roman"/>
+              </a:rPr>
+              <a:t>B</a:t>
+            </a:r>
+            <a:endParaRPr lang="en-US" sz="3200" dirty="0">
+              <a:solidFill>
+                <a:schemeClr val="bg1"/>
+              </a:solidFill>
+              <a:latin typeface="Times New Roman"/>
+              <a:cs typeface="Times New Roman"/>
+            </a:endParaRPr>
+          </a:p>
+        </p:txBody>
+      </p:sp>
+      <p:sp>
+        <p:nvSpPr>
+          <p:cNvPr id="112" name="TextBox 111"/>
+          <p:cNvSpPr txBox="1"/>
+          <p:nvPr/>
+        </p:nvSpPr>
+        <p:spPr>
+          <a:xfrm>
+            <a:off x="8549397" y="1155015"/>
+            <a:ext cx="1181100" cy="584776"/>
+          </a:xfrm>
+          <a:prstGeom prst="rect">
+            <a:avLst/>
+          </a:prstGeom>
+          <a:noFill/>
+        </p:spPr>
+        <p:txBody>
+          <a:bodyPr wrap="square" rtlCol="0">
+            <a:spAutoFit/>
+          </a:bodyPr>
+          <a:lstStyle/>
+          <a:p>
+            <a:r>
+              <a:rPr lang="en-US" sz="3200" dirty="0" smtClean="0">
+                <a:solidFill>
+                  <a:schemeClr val="bg1"/>
+                </a:solidFill>
+                <a:latin typeface="Times New Roman"/>
+                <a:cs typeface="Times New Roman"/>
+              </a:rPr>
+              <a:t>B</a:t>
+            </a:r>
+            <a:endParaRPr lang="en-US" sz="3200" dirty="0">
+              <a:solidFill>
+                <a:schemeClr val="bg1"/>
+              </a:solidFill>
+              <a:latin typeface="Times New Roman"/>
+              <a:cs typeface="Times New Roman"/>
+            </a:endParaRPr>
+          </a:p>
+        </p:txBody>
+      </p:sp>
+      <p:sp>
+        <p:nvSpPr>
+          <p:cNvPr id="113" name="TextBox 112"/>
+          <p:cNvSpPr txBox="1"/>
+          <p:nvPr/>
+        </p:nvSpPr>
+        <p:spPr>
+          <a:xfrm>
+            <a:off x="7806487" y="1147207"/>
+            <a:ext cx="1181100" cy="584776"/>
+          </a:xfrm>
+          <a:prstGeom prst="rect">
+            <a:avLst/>
+          </a:prstGeom>
+          <a:noFill/>
+        </p:spPr>
+        <p:txBody>
+          <a:bodyPr wrap="square" rtlCol="0">
+            <a:spAutoFit/>
+          </a:bodyPr>
+          <a:lstStyle/>
+          <a:p>
+            <a:r>
+              <a:rPr lang="en-US" sz="3200" dirty="0" smtClean="0">
+                <a:solidFill>
+                  <a:schemeClr val="bg1"/>
+                </a:solidFill>
+                <a:latin typeface="Times New Roman"/>
+                <a:cs typeface="Times New Roman"/>
+              </a:rPr>
+              <a:t>B</a:t>
+            </a:r>
+            <a:endParaRPr lang="en-US" sz="3200" dirty="0">
+              <a:solidFill>
+                <a:schemeClr val="bg1"/>
+              </a:solidFill>
+              <a:latin typeface="Times New Roman"/>
+              <a:cs typeface="Times New Roman"/>
+            </a:endParaRPr>
+          </a:p>
+        </p:txBody>
+      </p:sp>
+      <p:sp>
+        <p:nvSpPr>
+          <p:cNvPr id="114" name="TextBox 113"/>
+          <p:cNvSpPr txBox="1"/>
+          <p:nvPr/>
+        </p:nvSpPr>
+        <p:spPr>
+          <a:xfrm>
+            <a:off x="7338884" y="1153022"/>
+            <a:ext cx="1181100" cy="584776"/>
+          </a:xfrm>
+          <a:prstGeom prst="rect">
+            <a:avLst/>
+          </a:prstGeom>
+          <a:noFill/>
+        </p:spPr>
+        <p:txBody>
+          <a:bodyPr wrap="square" rtlCol="0">
+            <a:spAutoFit/>
+          </a:bodyPr>
+          <a:lstStyle/>
+          <a:p>
+            <a:r>
+              <a:rPr lang="en-US" sz="3200" dirty="0" smtClean="0">
+                <a:solidFill>
+                  <a:schemeClr val="bg1"/>
+                </a:solidFill>
+                <a:latin typeface="Times New Roman"/>
+                <a:cs typeface="Times New Roman"/>
+              </a:rPr>
+              <a:t>B</a:t>
+            </a:r>
+            <a:endParaRPr lang="en-US" sz="3200" dirty="0">
+              <a:solidFill>
+                <a:schemeClr val="bg1"/>
+              </a:solidFill>
+              <a:latin typeface="Times New Roman"/>
+              <a:cs typeface="Times New Roman"/>
+            </a:endParaRPr>
+          </a:p>
+        </p:txBody>
+      </p:sp>
+      <p:sp>
+        <p:nvSpPr>
+          <p:cNvPr id="115" name="TextBox 114"/>
+          <p:cNvSpPr txBox="1"/>
+          <p:nvPr/>
+        </p:nvSpPr>
+        <p:spPr>
+          <a:xfrm>
+            <a:off x="6895911" y="1131332"/>
+            <a:ext cx="1181100" cy="584776"/>
+          </a:xfrm>
+          <a:prstGeom prst="rect">
+            <a:avLst/>
+          </a:prstGeom>
+          <a:noFill/>
+        </p:spPr>
+        <p:txBody>
+          <a:bodyPr wrap="square" rtlCol="0">
+            <a:spAutoFit/>
+          </a:bodyPr>
+          <a:lstStyle/>
+          <a:p>
+            <a:r>
+              <a:rPr lang="en-US" sz="3200" dirty="0" smtClean="0">
+                <a:solidFill>
+                  <a:schemeClr val="bg1"/>
+                </a:solidFill>
+                <a:latin typeface="Times New Roman"/>
+                <a:cs typeface="Times New Roman"/>
+              </a:rPr>
+              <a:t>B</a:t>
+            </a:r>
+            <a:endParaRPr lang="en-US" sz="3200" dirty="0">
+              <a:solidFill>
+                <a:schemeClr val="bg1"/>
+              </a:solidFill>
+              <a:latin typeface="Times New Roman"/>
+              <a:cs typeface="Times New Roman"/>
+            </a:endParaRPr>
+          </a:p>
+        </p:txBody>
+      </p:sp>
+      <p:grpSp>
+        <p:nvGrpSpPr>
+          <p:cNvPr id="116" name="Group 115"/>
+          <p:cNvGrpSpPr/>
+          <p:nvPr/>
+        </p:nvGrpSpPr>
+        <p:grpSpPr>
+          <a:xfrm>
+            <a:off x="5988090" y="1441847"/>
+            <a:ext cx="2782652" cy="818256"/>
+            <a:chOff x="5797590" y="1969085"/>
+            <a:chExt cx="2782652" cy="818256"/>
+          </a:xfrm>
+        </p:grpSpPr>
+        <p:cxnSp>
+          <p:nvCxnSpPr>
+            <p:cNvPr id="117" name="Straight Arrow Connector 116"/>
+            <p:cNvCxnSpPr/>
+            <p:nvPr/>
+          </p:nvCxnSpPr>
+          <p:spPr>
+            <a:xfrm>
+              <a:off x="5797590" y="1969085"/>
+              <a:ext cx="1391326" cy="818256"/>
+            </a:xfrm>
+            <a:prstGeom prst="straightConnector1">
+              <a:avLst/>
+            </a:prstGeom>
+            <a:ln w="38100" cmpd="sng">
+              <a:solidFill>
+                <a:schemeClr val="tx1">
+                  <a:lumMod val="75000"/>
+                  <a:lumOff val="25000"/>
+                </a:schemeClr>
+              </a:solidFill>
+              <a:headEnd type="none"/>
+              <a:tailEnd type="triangle"/>
+            </a:ln>
+          </p:spPr>
+          <p:style>
+            <a:lnRef idx="2">
+              <a:schemeClr val="accent1"/>
+            </a:lnRef>
+            <a:fillRef idx="0">
+              <a:schemeClr val="accent1"/>
+            </a:fillRef>
+            <a:effectRef idx="1">
+              <a:schemeClr val="accent1"/>
+            </a:effectRef>
+            <a:fontRef idx="minor">
+              <a:schemeClr val="tx1"/>
+            </a:fontRef>
+          </p:style>
+        </p:cxnSp>
+        <p:cxnSp>
+          <p:nvCxnSpPr>
+            <p:cNvPr id="118" name="Straight Arrow Connector 117"/>
+            <p:cNvCxnSpPr/>
+            <p:nvPr/>
+          </p:nvCxnSpPr>
+          <p:spPr>
+            <a:xfrm flipV="1">
+              <a:off x="7188916" y="1969085"/>
+              <a:ext cx="1391326" cy="818256"/>
+            </a:xfrm>
+            <a:prstGeom prst="straightConnector1">
+              <a:avLst/>
+            </a:prstGeom>
+            <a:ln w="38100" cmpd="sng">
+              <a:solidFill>
+                <a:schemeClr val="tx1">
+                  <a:lumMod val="75000"/>
+                  <a:lumOff val="25000"/>
+                </a:schemeClr>
+              </a:solidFill>
+              <a:headEnd type="none"/>
+              <a:tailEnd type="triangle"/>
+            </a:ln>
+          </p:spPr>
+          <p:style>
+            <a:lnRef idx="2">
+              <a:schemeClr val="accent1"/>
+            </a:lnRef>
+            <a:fillRef idx="0">
+              <a:schemeClr val="accent1"/>
+            </a:fillRef>
+            <a:effectRef idx="1">
+              <a:schemeClr val="accent1"/>
+            </a:effectRef>
+            <a:fontRef idx="minor">
+              <a:schemeClr val="tx1"/>
+            </a:fontRef>
+          </p:style>
+        </p:cxnSp>
+        <p:cxnSp>
+          <p:nvCxnSpPr>
+            <p:cNvPr id="119" name="Straight Arrow Connector 118"/>
+            <p:cNvCxnSpPr/>
+            <p:nvPr/>
+          </p:nvCxnSpPr>
+          <p:spPr>
+            <a:xfrm flipH="1">
+              <a:off x="6858642" y="1969085"/>
+              <a:ext cx="1721600" cy="0"/>
+            </a:xfrm>
+            <a:prstGeom prst="straightConnector1">
+              <a:avLst/>
+            </a:prstGeom>
+            <a:ln w="38100" cmpd="sng">
+              <a:solidFill>
+                <a:schemeClr val="tx1">
+                  <a:lumMod val="75000"/>
+                  <a:lumOff val="25000"/>
+                </a:schemeClr>
+              </a:solidFill>
+              <a:headEnd type="none"/>
+              <a:tailEnd type="triangle"/>
+            </a:ln>
+          </p:spPr>
+          <p:style>
+            <a:lnRef idx="2">
+              <a:schemeClr val="accent1"/>
+            </a:lnRef>
+            <a:fillRef idx="0">
+              <a:schemeClr val="accent1"/>
+            </a:fillRef>
+            <a:effectRef idx="1">
+              <a:schemeClr val="accent1"/>
+            </a:effectRef>
+            <a:fontRef idx="minor">
+              <a:schemeClr val="tx1"/>
+            </a:fontRef>
+          </p:style>
+        </p:cxnSp>
+      </p:grpSp>
+      <p:sp>
+        <p:nvSpPr>
+          <p:cNvPr id="84" name="Rectangle 83"/>
+          <p:cNvSpPr/>
+          <p:nvPr/>
+        </p:nvSpPr>
+        <p:spPr>
+          <a:xfrm>
+            <a:off x="0" y="0"/>
+            <a:ext cx="9167040" cy="317457"/>
+          </a:xfrm>
+          <a:prstGeom prst="rect">
+            <a:avLst/>
+          </a:prstGeom>
+          <a:solidFill>
+            <a:schemeClr val="accent2">
+              <a:lumMod val="75000"/>
+            </a:schemeClr>
+          </a:solidFill>
+        </p:spPr>
+        <p:style>
+          <a:lnRef idx="1">
+            <a:schemeClr val="accent2"/>
+          </a:lnRef>
+          <a:fillRef idx="3">
+            <a:schemeClr val="accent2"/>
+          </a:fillRef>
+          <a:effectRef idx="2">
+            <a:schemeClr val="accent2"/>
+          </a:effectRef>
+          <a:fontRef idx="minor">
+            <a:schemeClr val="lt1"/>
+          </a:fontRef>
+        </p:style>
+        <p:txBody>
+          <a:bodyPr rtlCol="0" anchor="ctr"/>
+          <a:lstStyle/>
+          <a:p>
+            <a:pPr algn="ctr"/>
+            <a:endParaRPr lang="en-US" sz="3200"/>
+          </a:p>
+        </p:txBody>
+      </p:sp>
+      <p:sp>
+        <p:nvSpPr>
+          <p:cNvPr id="120" name="TextBox 119"/>
+          <p:cNvSpPr txBox="1"/>
+          <p:nvPr/>
+        </p:nvSpPr>
+        <p:spPr>
+          <a:xfrm>
+            <a:off x="330916" y="1558587"/>
+            <a:ext cx="1181100" cy="584776"/>
+          </a:xfrm>
+          <a:prstGeom prst="rect">
+            <a:avLst/>
+          </a:prstGeom>
+          <a:noFill/>
+        </p:spPr>
+        <p:txBody>
+          <a:bodyPr wrap="square" rtlCol="0">
+            <a:spAutoFit/>
+          </a:bodyPr>
+          <a:lstStyle/>
+          <a:p>
+            <a:r>
+              <a:rPr lang="en-US" sz="3200" dirty="0" smtClean="0">
+                <a:latin typeface="Times New Roman"/>
+                <a:cs typeface="Times New Roman"/>
+              </a:rPr>
+              <a:t>1.)</a:t>
+            </a:r>
+            <a:endParaRPr lang="en-US" sz="3200" dirty="0">
+              <a:latin typeface="Times New Roman"/>
+              <a:cs typeface="Times New Roman"/>
+            </a:endParaRPr>
+          </a:p>
+        </p:txBody>
+      </p:sp>
+      <p:sp>
+        <p:nvSpPr>
+          <p:cNvPr id="121" name="TextBox 120"/>
+          <p:cNvSpPr txBox="1"/>
+          <p:nvPr/>
+        </p:nvSpPr>
+        <p:spPr>
+          <a:xfrm>
+            <a:off x="2086617" y="1551662"/>
+            <a:ext cx="1181100" cy="584776"/>
+          </a:xfrm>
+          <a:prstGeom prst="rect">
+            <a:avLst/>
+          </a:prstGeom>
+          <a:noFill/>
+        </p:spPr>
+        <p:txBody>
+          <a:bodyPr wrap="square" rtlCol="0">
+            <a:spAutoFit/>
+          </a:bodyPr>
+          <a:lstStyle/>
+          <a:p>
+            <a:r>
+              <a:rPr lang="en-US" sz="3200" dirty="0" smtClean="0">
+                <a:latin typeface="Times New Roman"/>
+                <a:cs typeface="Times New Roman"/>
+              </a:rPr>
+              <a:t>2.)</a:t>
+            </a:r>
+            <a:endParaRPr lang="en-US" sz="3200" dirty="0">
+              <a:latin typeface="Times New Roman"/>
+              <a:cs typeface="Times New Roman"/>
+            </a:endParaRPr>
+          </a:p>
+        </p:txBody>
+      </p:sp>
+      <p:sp>
+        <p:nvSpPr>
+          <p:cNvPr id="122" name="TextBox 121"/>
+          <p:cNvSpPr txBox="1"/>
+          <p:nvPr/>
+        </p:nvSpPr>
+        <p:spPr>
+          <a:xfrm>
+            <a:off x="1251934" y="1226582"/>
+            <a:ext cx="1181100" cy="584776"/>
+          </a:xfrm>
+          <a:prstGeom prst="rect">
+            <a:avLst/>
+          </a:prstGeom>
+          <a:noFill/>
+        </p:spPr>
+        <p:txBody>
+          <a:bodyPr wrap="square" rtlCol="0">
+            <a:spAutoFit/>
+          </a:bodyPr>
+          <a:lstStyle/>
+          <a:p>
+            <a:r>
+              <a:rPr lang="en-US" sz="3200" dirty="0" smtClean="0">
+                <a:latin typeface="Times New Roman"/>
+                <a:cs typeface="Times New Roman"/>
+              </a:rPr>
+              <a:t>3.)</a:t>
+            </a:r>
+            <a:endParaRPr lang="en-US" sz="3200" dirty="0">
+              <a:latin typeface="Times New Roman"/>
+              <a:cs typeface="Times New Roman"/>
             </a:endParaRPr>
           </a:p>
         </p:txBody>

</xml_diff>